<commit_message>
Observer Patter example done
</commit_message>
<xml_diff>
--- a/RxAndroid.pptx
+++ b/RxAndroid.pptx
@@ -6,6 +6,8 @@
   </p:sldMasterIdLst>
   <p:sldIdLst>
     <p:sldId id="256" r:id="rId2"/>
+    <p:sldId id="257" r:id="rId3"/>
+    <p:sldId id="258" r:id="rId4"/>
   </p:sldIdLst>
   <p:sldSz cx="12192000" cy="6858000"/>
   <p:notesSz cx="6858000" cy="9144000"/>
@@ -104,6 +106,11 @@
       </a:defRPr>
     </a:lvl9pPr>
   </p:defaultTextStyle>
+  <p:extLst>
+    <p:ext uri="{EFAFB233-063F-42B5-8137-9DF3F51BA10A}">
+      <p15:sldGuideLst xmlns:p15="http://schemas.microsoft.com/office/powerpoint/2012/main"/>
+    </p:ext>
+  </p:extLst>
 </p:presentation>
 </file>
 
@@ -3025,6 +3032,248 @@
 </p:sld>
 </file>
 
+<file path=ppt/slides/slide2.xml><?xml version="1.0" encoding="utf-8"?>
+<p:sld xmlns:a="http://schemas.openxmlformats.org/drawingml/2006/main" xmlns:r="http://schemas.openxmlformats.org/officeDocument/2006/relationships" xmlns:p="http://schemas.openxmlformats.org/presentationml/2006/main">
+  <p:cSld>
+    <p:spTree>
+      <p:nvGrpSpPr>
+        <p:cNvPr id="1" name=""/>
+        <p:cNvGrpSpPr/>
+        <p:nvPr/>
+      </p:nvGrpSpPr>
+      <p:grpSpPr>
+        <a:xfrm>
+          <a:off x="0" y="0"/>
+          <a:ext cx="0" cy="0"/>
+          <a:chOff x="0" y="0"/>
+          <a:chExt cx="0" cy="0"/>
+        </a:xfrm>
+      </p:grpSpPr>
+      <p:sp>
+        <p:nvSpPr>
+          <p:cNvPr id="2" name="Title 1"/>
+          <p:cNvSpPr>
+            <a:spLocks noGrp="1"/>
+          </p:cNvSpPr>
+          <p:nvPr>
+            <p:ph type="title"/>
+          </p:nvPr>
+        </p:nvSpPr>
+        <p:spPr/>
+        <p:txBody>
+          <a:bodyPr/>
+          <a:lstStyle/>
+          <a:p>
+            <a:r>
+              <a:rPr lang="en-US" dirty="0" err="1" smtClean="0"/>
+              <a:t>ReactiveX</a:t>
+            </a:r>
+            <a:r>
+              <a:rPr lang="en-US" dirty="0" smtClean="0"/>
+              <a:t>?</a:t>
+            </a:r>
+            <a:endParaRPr lang="en-US" dirty="0"/>
+          </a:p>
+        </p:txBody>
+      </p:sp>
+      <p:pic>
+        <p:nvPicPr>
+          <p:cNvPr id="4" name="Content Placeholder 3"/>
+          <p:cNvPicPr>
+            <a:picLocks noGrp="1" noChangeAspect="1"/>
+          </p:cNvPicPr>
+          <p:nvPr>
+            <p:ph idx="1"/>
+          </p:nvPr>
+        </p:nvPicPr>
+        <p:blipFill>
+          <a:blip r:embed="rId2"/>
+          <a:stretch>
+            <a:fillRect/>
+          </a:stretch>
+        </p:blipFill>
+        <p:spPr>
+          <a:xfrm>
+            <a:off x="677713" y="1690688"/>
+            <a:ext cx="7334250" cy="1847850"/>
+          </a:xfrm>
+          <a:prstGeom prst="rect">
+            <a:avLst/>
+          </a:prstGeom>
+        </p:spPr>
+      </p:pic>
+      <p:pic>
+        <p:nvPicPr>
+          <p:cNvPr id="5" name="Picture 4"/>
+          <p:cNvPicPr>
+            <a:picLocks noChangeAspect="1"/>
+          </p:cNvPicPr>
+          <p:nvPr/>
+        </p:nvPicPr>
+        <p:blipFill>
+          <a:blip r:embed="rId3"/>
+          <a:stretch>
+            <a:fillRect/>
+          </a:stretch>
+        </p:blipFill>
+        <p:spPr>
+          <a:xfrm>
+            <a:off x="838200" y="3857985"/>
+            <a:ext cx="10534650" cy="1695450"/>
+          </a:xfrm>
+          <a:prstGeom prst="rect">
+            <a:avLst/>
+          </a:prstGeom>
+        </p:spPr>
+      </p:pic>
+    </p:spTree>
+    <p:extLst>
+      <p:ext uri="{BB962C8B-B14F-4D97-AF65-F5344CB8AC3E}">
+        <p14:creationId xmlns:p14="http://schemas.microsoft.com/office/powerpoint/2010/main" val="1575086118"/>
+      </p:ext>
+    </p:extLst>
+  </p:cSld>
+  <p:clrMapOvr>
+    <a:masterClrMapping/>
+  </p:clrMapOvr>
+</p:sld>
+</file>
+
+<file path=ppt/slides/slide3.xml><?xml version="1.0" encoding="utf-8"?>
+<p:sld xmlns:a="http://schemas.openxmlformats.org/drawingml/2006/main" xmlns:r="http://schemas.openxmlformats.org/officeDocument/2006/relationships" xmlns:p="http://schemas.openxmlformats.org/presentationml/2006/main">
+  <p:cSld>
+    <p:spTree>
+      <p:nvGrpSpPr>
+        <p:cNvPr id="1" name=""/>
+        <p:cNvGrpSpPr/>
+        <p:nvPr/>
+      </p:nvGrpSpPr>
+      <p:grpSpPr>
+        <a:xfrm>
+          <a:off x="0" y="0"/>
+          <a:ext cx="0" cy="0"/>
+          <a:chOff x="0" y="0"/>
+          <a:chExt cx="0" cy="0"/>
+        </a:xfrm>
+      </p:grpSpPr>
+      <p:sp>
+        <p:nvSpPr>
+          <p:cNvPr id="2" name="Title 1"/>
+          <p:cNvSpPr>
+            <a:spLocks noGrp="1"/>
+          </p:cNvSpPr>
+          <p:nvPr>
+            <p:ph type="title"/>
+          </p:nvPr>
+        </p:nvSpPr>
+        <p:spPr/>
+        <p:txBody>
+          <a:bodyPr/>
+          <a:lstStyle/>
+          <a:p>
+            <a:r>
+              <a:rPr lang="en-US" dirty="0" smtClean="0"/>
+              <a:t>Observer Pattern? </a:t>
+            </a:r>
+            <a:endParaRPr lang="en-US" dirty="0"/>
+          </a:p>
+        </p:txBody>
+      </p:sp>
+      <p:pic>
+        <p:nvPicPr>
+          <p:cNvPr id="3" name="Picture 2"/>
+          <p:cNvPicPr>
+            <a:picLocks noChangeAspect="1"/>
+          </p:cNvPicPr>
+          <p:nvPr/>
+        </p:nvPicPr>
+        <p:blipFill>
+          <a:blip r:embed="rId2"/>
+          <a:stretch>
+            <a:fillRect/>
+          </a:stretch>
+        </p:blipFill>
+        <p:spPr>
+          <a:xfrm>
+            <a:off x="838200" y="1690688"/>
+            <a:ext cx="4800600" cy="2009775"/>
+          </a:xfrm>
+          <a:prstGeom prst="rect">
+            <a:avLst/>
+          </a:prstGeom>
+        </p:spPr>
+      </p:pic>
+      <p:sp>
+        <p:nvSpPr>
+          <p:cNvPr id="4" name="Rectangle 3"/>
+          <p:cNvSpPr/>
+          <p:nvPr/>
+        </p:nvSpPr>
+        <p:spPr>
+          <a:xfrm>
+            <a:off x="4178060" y="4191332"/>
+            <a:ext cx="7243314" cy="1200329"/>
+          </a:xfrm>
+          <a:prstGeom prst="rect">
+            <a:avLst/>
+          </a:prstGeom>
+        </p:spPr>
+        <p:txBody>
+          <a:bodyPr wrap="square">
+            <a:spAutoFit/>
+          </a:bodyPr>
+          <a:lstStyle/>
+          <a:p>
+            <a:r>
+              <a:rPr lang="en-US" dirty="0">
+                <a:solidFill>
+                  <a:srgbClr val="000000"/>
+                </a:solidFill>
+                <a:latin typeface="Arial" panose="020B0604020202020204" pitchFamily="34" charset="0"/>
+                <a:cs typeface="Arial" panose="020B0604020202020204" pitchFamily="34" charset="0"/>
+              </a:rPr>
+              <a:t>Observer pattern is used when there is one-to-many relationship between objects such as if one object is modified, its </a:t>
+            </a:r>
+            <a:r>
+              <a:rPr lang="en-US" dirty="0" smtClean="0">
+                <a:solidFill>
+                  <a:srgbClr val="000000"/>
+                </a:solidFill>
+                <a:latin typeface="Arial" panose="020B0604020202020204" pitchFamily="34" charset="0"/>
+                <a:cs typeface="Arial" panose="020B0604020202020204" pitchFamily="34" charset="0"/>
+              </a:rPr>
+              <a:t>dependent </a:t>
+            </a:r>
+            <a:r>
+              <a:rPr lang="en-US" dirty="0">
+                <a:solidFill>
+                  <a:srgbClr val="000000"/>
+                </a:solidFill>
+                <a:latin typeface="Arial" panose="020B0604020202020204" pitchFamily="34" charset="0"/>
+                <a:cs typeface="Arial" panose="020B0604020202020204" pitchFamily="34" charset="0"/>
+              </a:rPr>
+              <a:t>objects are to be notified automatically. Observer pattern falls under behavioral pattern category.</a:t>
+            </a:r>
+            <a:endParaRPr lang="en-US" dirty="0">
+              <a:latin typeface="Arial" panose="020B0604020202020204" pitchFamily="34" charset="0"/>
+              <a:cs typeface="Arial" panose="020B0604020202020204" pitchFamily="34" charset="0"/>
+            </a:endParaRPr>
+          </a:p>
+        </p:txBody>
+      </p:sp>
+    </p:spTree>
+    <p:extLst>
+      <p:ext uri="{BB962C8B-B14F-4D97-AF65-F5344CB8AC3E}">
+        <p14:creationId xmlns:p14="http://schemas.microsoft.com/office/powerpoint/2010/main" val="289150378"/>
+      </p:ext>
+    </p:extLst>
+  </p:cSld>
+  <p:clrMapOvr>
+    <a:masterClrMapping/>
+  </p:clrMapOvr>
+</p:sld>
+</file>
+
 <file path=ppt/theme/theme1.xml><?xml version="1.0" encoding="utf-8"?>
 <a:theme xmlns:a="http://schemas.openxmlformats.org/drawingml/2006/main" name="Office Theme">
   <a:themeElements>

</xml_diff>

<commit_message>
Java Future example done
</commit_message>
<xml_diff>
--- a/RxAndroid.pptx
+++ b/RxAndroid.pptx
@@ -8,6 +8,7 @@
     <p:sldId id="256" r:id="rId2"/>
     <p:sldId id="257" r:id="rId3"/>
     <p:sldId id="258" r:id="rId4"/>
+    <p:sldId id="259" r:id="rId5"/>
   </p:sldIdLst>
   <p:sldSz cx="12192000" cy="6858000"/>
   <p:notesSz cx="6858000" cy="9144000"/>
@@ -245,7 +246,7 @@
           <a:p>
             <a:fld id="{ACD2B237-3B7B-412C-8948-813F138F6F03}" type="datetimeFigureOut">
               <a:rPr lang="en-US" smtClean="0"/>
-              <a:t>9/13/2016</a:t>
+              <a:t>9/21/2016</a:t>
             </a:fld>
             <a:endParaRPr lang="en-US"/>
           </a:p>
@@ -415,7 +416,7 @@
           <a:p>
             <a:fld id="{ACD2B237-3B7B-412C-8948-813F138F6F03}" type="datetimeFigureOut">
               <a:rPr lang="en-US" smtClean="0"/>
-              <a:t>9/13/2016</a:t>
+              <a:t>9/21/2016</a:t>
             </a:fld>
             <a:endParaRPr lang="en-US"/>
           </a:p>
@@ -595,7 +596,7 @@
           <a:p>
             <a:fld id="{ACD2B237-3B7B-412C-8948-813F138F6F03}" type="datetimeFigureOut">
               <a:rPr lang="en-US" smtClean="0"/>
-              <a:t>9/13/2016</a:t>
+              <a:t>9/21/2016</a:t>
             </a:fld>
             <a:endParaRPr lang="en-US"/>
           </a:p>
@@ -765,7 +766,7 @@
           <a:p>
             <a:fld id="{ACD2B237-3B7B-412C-8948-813F138F6F03}" type="datetimeFigureOut">
               <a:rPr lang="en-US" smtClean="0"/>
-              <a:t>9/13/2016</a:t>
+              <a:t>9/21/2016</a:t>
             </a:fld>
             <a:endParaRPr lang="en-US"/>
           </a:p>
@@ -1011,7 +1012,7 @@
           <a:p>
             <a:fld id="{ACD2B237-3B7B-412C-8948-813F138F6F03}" type="datetimeFigureOut">
               <a:rPr lang="en-US" smtClean="0"/>
-              <a:t>9/13/2016</a:t>
+              <a:t>9/21/2016</a:t>
             </a:fld>
             <a:endParaRPr lang="en-US"/>
           </a:p>
@@ -1243,7 +1244,7 @@
           <a:p>
             <a:fld id="{ACD2B237-3B7B-412C-8948-813F138F6F03}" type="datetimeFigureOut">
               <a:rPr lang="en-US" smtClean="0"/>
-              <a:t>9/13/2016</a:t>
+              <a:t>9/21/2016</a:t>
             </a:fld>
             <a:endParaRPr lang="en-US"/>
           </a:p>
@@ -1610,7 +1611,7 @@
           <a:p>
             <a:fld id="{ACD2B237-3B7B-412C-8948-813F138F6F03}" type="datetimeFigureOut">
               <a:rPr lang="en-US" smtClean="0"/>
-              <a:t>9/13/2016</a:t>
+              <a:t>9/21/2016</a:t>
             </a:fld>
             <a:endParaRPr lang="en-US"/>
           </a:p>
@@ -1728,7 +1729,7 @@
           <a:p>
             <a:fld id="{ACD2B237-3B7B-412C-8948-813F138F6F03}" type="datetimeFigureOut">
               <a:rPr lang="en-US" smtClean="0"/>
-              <a:t>9/13/2016</a:t>
+              <a:t>9/21/2016</a:t>
             </a:fld>
             <a:endParaRPr lang="en-US"/>
           </a:p>
@@ -1823,7 +1824,7 @@
           <a:p>
             <a:fld id="{ACD2B237-3B7B-412C-8948-813F138F6F03}" type="datetimeFigureOut">
               <a:rPr lang="en-US" smtClean="0"/>
-              <a:t>9/13/2016</a:t>
+              <a:t>9/21/2016</a:t>
             </a:fld>
             <a:endParaRPr lang="en-US"/>
           </a:p>
@@ -2100,7 +2101,7 @@
           <a:p>
             <a:fld id="{ACD2B237-3B7B-412C-8948-813F138F6F03}" type="datetimeFigureOut">
               <a:rPr lang="en-US" smtClean="0"/>
-              <a:t>9/13/2016</a:t>
+              <a:t>9/21/2016</a:t>
             </a:fld>
             <a:endParaRPr lang="en-US"/>
           </a:p>
@@ -2353,7 +2354,7 @@
           <a:p>
             <a:fld id="{ACD2B237-3B7B-412C-8948-813F138F6F03}" type="datetimeFigureOut">
               <a:rPr lang="en-US" smtClean="0"/>
-              <a:t>9/13/2016</a:t>
+              <a:t>9/21/2016</a:t>
             </a:fld>
             <a:endParaRPr lang="en-US"/>
           </a:p>
@@ -2566,7 +2567,7 @@
           <a:p>
             <a:fld id="{ACD2B237-3B7B-412C-8948-813F138F6F03}" type="datetimeFigureOut">
               <a:rPr lang="en-US" smtClean="0"/>
-              <a:t>9/13/2016</a:t>
+              <a:t>9/21/2016</a:t>
             </a:fld>
             <a:endParaRPr lang="en-US"/>
           </a:p>
@@ -3211,7 +3212,7 @@
         </p:nvSpPr>
         <p:spPr>
           <a:xfrm>
-            <a:off x="4178060" y="4191332"/>
+            <a:off x="4195313" y="3906661"/>
             <a:ext cx="7243314" cy="1200329"/>
           </a:xfrm>
           <a:prstGeom prst="rect">
@@ -3261,10 +3262,161 @@
           </a:p>
         </p:txBody>
       </p:sp>
+      <p:sp>
+        <p:nvSpPr>
+          <p:cNvPr id="5" name="TextBox 4"/>
+          <p:cNvSpPr txBox="1"/>
+          <p:nvPr/>
+        </p:nvSpPr>
+        <p:spPr>
+          <a:xfrm>
+            <a:off x="838200" y="5313188"/>
+            <a:ext cx="7409234" cy="923330"/>
+          </a:xfrm>
+          <a:prstGeom prst="rect">
+            <a:avLst/>
+          </a:prstGeom>
+          <a:noFill/>
+        </p:spPr>
+        <p:txBody>
+          <a:bodyPr wrap="square" rtlCol="0">
+            <a:spAutoFit/>
+          </a:bodyPr>
+          <a:lstStyle/>
+          <a:p>
+            <a:r>
+              <a:rPr lang="en-US" dirty="0"/>
+              <a:t>Remember </a:t>
+            </a:r>
+            <a:r>
+              <a:rPr lang="en-US" dirty="0" err="1"/>
+              <a:t>notifyDataSetChanged</a:t>
+            </a:r>
+            <a:r>
+              <a:rPr lang="en-US" dirty="0"/>
+              <a:t>() from </a:t>
+            </a:r>
+            <a:r>
+              <a:rPr lang="en-US" dirty="0" err="1"/>
+              <a:t>recyclerView</a:t>
+            </a:r>
+            <a:r>
+              <a:rPr lang="en-US" dirty="0"/>
+              <a:t>. It uses observer pattern to update views</a:t>
+            </a:r>
+          </a:p>
+          <a:p>
+            <a:endParaRPr lang="en-US" dirty="0"/>
+          </a:p>
+        </p:txBody>
+      </p:sp>
     </p:spTree>
     <p:extLst>
       <p:ext uri="{BB962C8B-B14F-4D97-AF65-F5344CB8AC3E}">
         <p14:creationId xmlns:p14="http://schemas.microsoft.com/office/powerpoint/2010/main" val="289150378"/>
+      </p:ext>
+    </p:extLst>
+  </p:cSld>
+  <p:clrMapOvr>
+    <a:masterClrMapping/>
+  </p:clrMapOvr>
+</p:sld>
+</file>
+
+<file path=ppt/slides/slide4.xml><?xml version="1.0" encoding="utf-8"?>
+<p:sld xmlns:a="http://schemas.openxmlformats.org/drawingml/2006/main" xmlns:r="http://schemas.openxmlformats.org/officeDocument/2006/relationships" xmlns:p="http://schemas.openxmlformats.org/presentationml/2006/main">
+  <p:cSld>
+    <p:spTree>
+      <p:nvGrpSpPr>
+        <p:cNvPr id="1" name=""/>
+        <p:cNvGrpSpPr/>
+        <p:nvPr/>
+      </p:nvGrpSpPr>
+      <p:grpSpPr>
+        <a:xfrm>
+          <a:off x="0" y="0"/>
+          <a:ext cx="0" cy="0"/>
+          <a:chOff x="0" y="0"/>
+          <a:chExt cx="0" cy="0"/>
+        </a:xfrm>
+      </p:grpSpPr>
+      <p:sp>
+        <p:nvSpPr>
+          <p:cNvPr id="2" name="Title 1"/>
+          <p:cNvSpPr>
+            <a:spLocks noGrp="1"/>
+          </p:cNvSpPr>
+          <p:nvPr>
+            <p:ph type="title"/>
+          </p:nvPr>
+        </p:nvSpPr>
+        <p:spPr/>
+        <p:txBody>
+          <a:bodyPr/>
+          <a:lstStyle/>
+          <a:p>
+            <a:r>
+              <a:rPr lang="en-US" dirty="0" smtClean="0"/>
+              <a:t>Java Future?</a:t>
+            </a:r>
+            <a:endParaRPr lang="en-US" dirty="0"/>
+          </a:p>
+        </p:txBody>
+      </p:sp>
+      <p:pic>
+        <p:nvPicPr>
+          <p:cNvPr id="4" name="Content Placeholder 3"/>
+          <p:cNvPicPr>
+            <a:picLocks noGrp="1" noChangeAspect="1"/>
+          </p:cNvPicPr>
+          <p:nvPr>
+            <p:ph idx="1"/>
+          </p:nvPr>
+        </p:nvPicPr>
+        <p:blipFill>
+          <a:blip r:embed="rId2"/>
+          <a:stretch>
+            <a:fillRect/>
+          </a:stretch>
+        </p:blipFill>
+        <p:spPr>
+          <a:xfrm>
+            <a:off x="4245455" y="1690688"/>
+            <a:ext cx="6496050" cy="2276475"/>
+          </a:xfrm>
+          <a:prstGeom prst="rect">
+            <a:avLst/>
+          </a:prstGeom>
+        </p:spPr>
+      </p:pic>
+      <p:pic>
+        <p:nvPicPr>
+          <p:cNvPr id="5" name="Picture 4"/>
+          <p:cNvPicPr>
+            <a:picLocks noChangeAspect="1"/>
+          </p:cNvPicPr>
+          <p:nvPr/>
+        </p:nvPicPr>
+        <p:blipFill>
+          <a:blip r:embed="rId3"/>
+          <a:stretch>
+            <a:fillRect/>
+          </a:stretch>
+        </p:blipFill>
+        <p:spPr>
+          <a:xfrm>
+            <a:off x="838200" y="4530395"/>
+            <a:ext cx="9039225" cy="1247775"/>
+          </a:xfrm>
+          <a:prstGeom prst="rect">
+            <a:avLst/>
+          </a:prstGeom>
+        </p:spPr>
+      </p:pic>
+    </p:spTree>
+    <p:extLst>
+      <p:ext uri="{BB962C8B-B14F-4D97-AF65-F5344CB8AC3E}">
+        <p14:creationId xmlns:p14="http://schemas.microsoft.com/office/powerpoint/2010/main" val="2932209780"/>
       </p:ext>
     </p:extLst>
   </p:cSld>

</xml_diff>